<commit_message>
code cleanup database page
</commit_message>
<xml_diff>
--- a/RideShare.pptx
+++ b/RideShare.pptx
@@ -5134,7 +5134,7 @@
           <a:p>
             <a:fld id="{4AAD347D-5ACD-4C99-B74B-A9C85AD731AF}" type="datetimeFigureOut">
               <a:rPr lang="en-US" dirty="0"/>
-              <a:t>4/24/2019</a:t>
+              <a:t>4/25/2019</a:t>
             </a:fld>
             <a:endParaRPr lang="en-US" dirty="0"/>
           </a:p>
@@ -5404,7 +5404,7 @@
           <a:p>
             <a:fld id="{4509A250-FF31-4206-8172-F9D3106AACB1}" type="datetimeFigureOut">
               <a:rPr lang="en-US" dirty="0"/>
-              <a:t>4/24/2019</a:t>
+              <a:t>4/25/2019</a:t>
             </a:fld>
             <a:endParaRPr lang="en-US" dirty="0"/>
           </a:p>
@@ -5593,7 +5593,7 @@
           <a:p>
             <a:fld id="{4509A250-FF31-4206-8172-F9D3106AACB1}" type="datetimeFigureOut">
               <a:rPr lang="en-US" dirty="0"/>
-              <a:t>4/24/2019</a:t>
+              <a:t>4/25/2019</a:t>
             </a:fld>
             <a:endParaRPr lang="en-US" dirty="0"/>
           </a:p>
@@ -5859,7 +5859,7 @@
           <a:p>
             <a:fld id="{4509A250-FF31-4206-8172-F9D3106AACB1}" type="datetimeFigureOut">
               <a:rPr lang="en-US" dirty="0"/>
-              <a:t>4/24/2019</a:t>
+              <a:t>4/25/2019</a:t>
             </a:fld>
             <a:endParaRPr lang="en-US" dirty="0"/>
           </a:p>
@@ -6181,7 +6181,7 @@
           <a:p>
             <a:fld id="{4509A250-FF31-4206-8172-F9D3106AACB1}" type="datetimeFigureOut">
               <a:rPr lang="en-US" dirty="0"/>
-              <a:t>4/24/2019</a:t>
+              <a:t>4/25/2019</a:t>
             </a:fld>
             <a:endParaRPr lang="en-US" dirty="0"/>
           </a:p>
@@ -6795,7 +6795,7 @@
           <a:p>
             <a:fld id="{4509A250-FF31-4206-8172-F9D3106AACB1}" type="datetimeFigureOut">
               <a:rPr lang="en-US" dirty="0"/>
-              <a:t>4/24/2019</a:t>
+              <a:t>4/25/2019</a:t>
             </a:fld>
             <a:endParaRPr lang="en-US" dirty="0"/>
           </a:p>
@@ -7637,7 +7637,7 @@
           <a:p>
             <a:fld id="{4509A250-FF31-4206-8172-F9D3106AACB1}" type="datetimeFigureOut">
               <a:rPr lang="en-US" dirty="0"/>
-              <a:t>4/24/2019</a:t>
+              <a:t>4/25/2019</a:t>
             </a:fld>
             <a:endParaRPr lang="en-US" dirty="0"/>
           </a:p>
@@ -7802,7 +7802,7 @@
           <a:p>
             <a:fld id="{4509A250-FF31-4206-8172-F9D3106AACB1}" type="datetimeFigureOut">
               <a:rPr lang="en-US" dirty="0"/>
-              <a:t>4/24/2019</a:t>
+              <a:t>4/25/2019</a:t>
             </a:fld>
             <a:endParaRPr lang="en-US" dirty="0"/>
           </a:p>
@@ -7977,7 +7977,7 @@
           <a:p>
             <a:fld id="{4509A250-FF31-4206-8172-F9D3106AACB1}" type="datetimeFigureOut">
               <a:rPr lang="en-US" dirty="0"/>
-              <a:t>4/24/2019</a:t>
+              <a:t>4/25/2019</a:t>
             </a:fld>
             <a:endParaRPr lang="en-US" dirty="0"/>
           </a:p>
@@ -8142,7 +8142,7 @@
           <a:p>
             <a:fld id="{9796027F-7875-4030-9381-8BD8C4F21935}" type="datetimeFigureOut">
               <a:rPr lang="en-US" dirty="0"/>
-              <a:t>4/24/2019</a:t>
+              <a:t>4/25/2019</a:t>
             </a:fld>
             <a:endParaRPr lang="en-US" dirty="0"/>
           </a:p>
@@ -8384,7 +8384,7 @@
           <a:p>
             <a:fld id="{9796027F-7875-4030-9381-8BD8C4F21935}" type="datetimeFigureOut">
               <a:rPr lang="en-US" dirty="0"/>
-              <a:t>4/24/2019</a:t>
+              <a:t>4/25/2019</a:t>
             </a:fld>
             <a:endParaRPr lang="en-US" dirty="0"/>
           </a:p>
@@ -8671,7 +8671,7 @@
           <a:p>
             <a:fld id="{9796027F-7875-4030-9381-8BD8C4F21935}" type="datetimeFigureOut">
               <a:rPr lang="en-US" dirty="0"/>
-              <a:t>4/24/2019</a:t>
+              <a:t>4/25/2019</a:t>
             </a:fld>
             <a:endParaRPr lang="en-US" dirty="0"/>
           </a:p>
@@ -9110,7 +9110,7 @@
           <a:p>
             <a:fld id="{9796027F-7875-4030-9381-8BD8C4F21935}" type="datetimeFigureOut">
               <a:rPr lang="en-US" dirty="0"/>
-              <a:t>4/24/2019</a:t>
+              <a:t>4/25/2019</a:t>
             </a:fld>
             <a:endParaRPr lang="en-US" dirty="0"/>
           </a:p>
@@ -9223,7 +9223,7 @@
           <a:p>
             <a:fld id="{4509A250-FF31-4206-8172-F9D3106AACB1}" type="datetimeFigureOut">
               <a:rPr lang="en-US" dirty="0"/>
-              <a:t>4/24/2019</a:t>
+              <a:t>4/25/2019</a:t>
             </a:fld>
             <a:endParaRPr lang="en-US" dirty="0"/>
           </a:p>
@@ -9313,7 +9313,7 @@
           <a:p>
             <a:fld id="{4509A250-FF31-4206-8172-F9D3106AACB1}" type="datetimeFigureOut">
               <a:rPr lang="en-US" dirty="0"/>
-              <a:t>4/24/2019</a:t>
+              <a:t>4/25/2019</a:t>
             </a:fld>
             <a:endParaRPr lang="en-US" dirty="0"/>
           </a:p>
@@ -9587,7 +9587,7 @@
           <a:p>
             <a:fld id="{4509A250-FF31-4206-8172-F9D3106AACB1}" type="datetimeFigureOut">
               <a:rPr lang="en-US" dirty="0"/>
-              <a:t>4/24/2019</a:t>
+              <a:t>4/25/2019</a:t>
             </a:fld>
             <a:endParaRPr lang="en-US" dirty="0"/>
           </a:p>
@@ -9857,7 +9857,7 @@
           <a:p>
             <a:fld id="{4509A250-FF31-4206-8172-F9D3106AACB1}" type="datetimeFigureOut">
               <a:rPr lang="en-US" dirty="0"/>
-              <a:t>4/24/2019</a:t>
+              <a:t>4/25/2019</a:t>
             </a:fld>
             <a:endParaRPr lang="en-US" dirty="0"/>
           </a:p>
@@ -10275,7 +10275,7 @@
           <a:p>
             <a:fld id="{4AAD347D-5ACD-4C99-B74B-A9C85AD731AF}" type="datetimeFigureOut">
               <a:rPr lang="en-US" dirty="0"/>
-              <a:t>4/24/2019</a:t>
+              <a:t>4/25/2019</a:t>
             </a:fld>
             <a:endParaRPr lang="en-US" dirty="0"/>
           </a:p>
@@ -12260,7 +12260,7 @@
         </p:blipFill>
         <p:spPr>
           <a:xfrm>
-            <a:off x="1349004" y="1400175"/>
+            <a:off x="1393639" y="1409052"/>
             <a:ext cx="9404722" cy="4848225"/>
           </a:xfrm>
         </p:spPr>
@@ -12675,9 +12675,15 @@
         <p:spPr/>
         <p:txBody>
           <a:bodyPr>
-            <a:normAutofit fontScale="85000" lnSpcReduction="20000"/>
+            <a:normAutofit fontScale="70000" lnSpcReduction="20000"/>
           </a:bodyPr>
           <a:lstStyle/>
+          <a:p>
+            <a:r>
+              <a:rPr lang="en-IE" dirty="0"/>
+              <a:t>From a project to a product</a:t>
+            </a:r>
+          </a:p>
           <a:p>
             <a:r>
               <a:rPr lang="en-IE" dirty="0"/>

</xml_diff>